<commit_message>
se creó validación 13 que permite entrenar mejor los modelos
</commit_message>
<xml_diff>
--- a/Analisis Diario 2024 04 LSTMv2.pptx
+++ b/Analisis Diario 2024 04 LSTMv2.pptx
@@ -104,6 +104,11 @@
       </a:defRPr>
     </a:lvl9pPr>
   </p:defaultTextStyle>
+  <p:extLst>
+    <p:ext uri="{EFAFB233-063F-42B5-8137-9DF3F51BA10A}">
+      <p15:sldGuideLst xmlns:p15="http://schemas.microsoft.com/office/powerpoint/2012/main"/>
+    </p:ext>
+  </p:extLst>
 </p:presentation>
 </file>
 
@@ -256,7 +261,7 @@
           <a:p>
             <a:fld id="{1A03CA55-1C5D-AA49-9541-39C5BF53104E}" type="datetimeFigureOut">
               <a:rPr lang="es-CO" smtClean="0"/>
-              <a:t>2/04/24</a:t>
+              <a:t>5/04/24</a:t>
             </a:fld>
             <a:endParaRPr lang="es-CO"/>
           </a:p>
@@ -456,7 +461,7 @@
           <a:p>
             <a:fld id="{1A03CA55-1C5D-AA49-9541-39C5BF53104E}" type="datetimeFigureOut">
               <a:rPr lang="es-CO" smtClean="0"/>
-              <a:t>2/04/24</a:t>
+              <a:t>5/04/24</a:t>
             </a:fld>
             <a:endParaRPr lang="es-CO"/>
           </a:p>
@@ -666,7 +671,7 @@
           <a:p>
             <a:fld id="{1A03CA55-1C5D-AA49-9541-39C5BF53104E}" type="datetimeFigureOut">
               <a:rPr lang="es-CO" smtClean="0"/>
-              <a:t>2/04/24</a:t>
+              <a:t>5/04/24</a:t>
             </a:fld>
             <a:endParaRPr lang="es-CO"/>
           </a:p>
@@ -866,7 +871,7 @@
           <a:p>
             <a:fld id="{1A03CA55-1C5D-AA49-9541-39C5BF53104E}" type="datetimeFigureOut">
               <a:rPr lang="es-CO" smtClean="0"/>
-              <a:t>2/04/24</a:t>
+              <a:t>5/04/24</a:t>
             </a:fld>
             <a:endParaRPr lang="es-CO"/>
           </a:p>
@@ -1142,7 +1147,7 @@
           <a:p>
             <a:fld id="{1A03CA55-1C5D-AA49-9541-39C5BF53104E}" type="datetimeFigureOut">
               <a:rPr lang="es-CO" smtClean="0"/>
-              <a:t>2/04/24</a:t>
+              <a:t>5/04/24</a:t>
             </a:fld>
             <a:endParaRPr lang="es-CO"/>
           </a:p>
@@ -1410,7 +1415,7 @@
           <a:p>
             <a:fld id="{1A03CA55-1C5D-AA49-9541-39C5BF53104E}" type="datetimeFigureOut">
               <a:rPr lang="es-CO" smtClean="0"/>
-              <a:t>2/04/24</a:t>
+              <a:t>5/04/24</a:t>
             </a:fld>
             <a:endParaRPr lang="es-CO"/>
           </a:p>
@@ -1825,7 +1830,7 @@
           <a:p>
             <a:fld id="{1A03CA55-1C5D-AA49-9541-39C5BF53104E}" type="datetimeFigureOut">
               <a:rPr lang="es-CO" smtClean="0"/>
-              <a:t>2/04/24</a:t>
+              <a:t>5/04/24</a:t>
             </a:fld>
             <a:endParaRPr lang="es-CO"/>
           </a:p>
@@ -1967,7 +1972,7 @@
           <a:p>
             <a:fld id="{1A03CA55-1C5D-AA49-9541-39C5BF53104E}" type="datetimeFigureOut">
               <a:rPr lang="es-CO" smtClean="0"/>
-              <a:t>2/04/24</a:t>
+              <a:t>5/04/24</a:t>
             </a:fld>
             <a:endParaRPr lang="es-CO"/>
           </a:p>
@@ -2080,7 +2085,7 @@
           <a:p>
             <a:fld id="{1A03CA55-1C5D-AA49-9541-39C5BF53104E}" type="datetimeFigureOut">
               <a:rPr lang="es-CO" smtClean="0"/>
-              <a:t>2/04/24</a:t>
+              <a:t>5/04/24</a:t>
             </a:fld>
             <a:endParaRPr lang="es-CO"/>
           </a:p>
@@ -2393,7 +2398,7 @@
           <a:p>
             <a:fld id="{1A03CA55-1C5D-AA49-9541-39C5BF53104E}" type="datetimeFigureOut">
               <a:rPr lang="es-CO" smtClean="0"/>
-              <a:t>2/04/24</a:t>
+              <a:t>5/04/24</a:t>
             </a:fld>
             <a:endParaRPr lang="es-CO"/>
           </a:p>
@@ -2682,7 +2687,7 @@
           <a:p>
             <a:fld id="{1A03CA55-1C5D-AA49-9541-39C5BF53104E}" type="datetimeFigureOut">
               <a:rPr lang="es-CO" smtClean="0"/>
-              <a:t>2/04/24</a:t>
+              <a:t>5/04/24</a:t>
             </a:fld>
             <a:endParaRPr lang="es-CO"/>
           </a:p>
@@ -2925,7 +2930,7 @@
           <a:p>
             <a:fld id="{1A03CA55-1C5D-AA49-9541-39C5BF53104E}" type="datetimeFigureOut">
               <a:rPr lang="es-CO" smtClean="0"/>
-              <a:t>2/04/24</a:t>
+              <a:t>5/04/24</a:t>
             </a:fld>
             <a:endParaRPr lang="es-CO"/>
           </a:p>
@@ -3432,7 +3437,7 @@
                     <a:bodyPr/>
                     <a:lstStyle/>
                     <a:p>
-                      <a:endParaRPr lang="es-CO"/>
+                      <a:endParaRPr lang="es-CO" dirty="0"/>
                     </a:p>
                   </a:txBody>
                   <a:tcPr/>
@@ -3452,7 +3457,7 @@
                     <a:bodyPr/>
                     <a:lstStyle/>
                     <a:p>
-                      <a:endParaRPr lang="es-CO"/>
+                      <a:endParaRPr lang="es-CO" dirty="0"/>
                     </a:p>
                   </a:txBody>
                   <a:tcPr/>
@@ -3462,7 +3467,7 @@
                     <a:bodyPr/>
                     <a:lstStyle/>
                     <a:p>
-                      <a:endParaRPr lang="es-CO"/>
+                      <a:endParaRPr lang="es-CO" dirty="0"/>
                     </a:p>
                   </a:txBody>
                   <a:tcPr/>
@@ -3529,7 +3534,7 @@
                     <a:bodyPr/>
                     <a:lstStyle/>
                     <a:p>
-                      <a:endParaRPr lang="es-CO"/>
+                      <a:endParaRPr lang="es-CO" dirty="0"/>
                     </a:p>
                   </a:txBody>
                   <a:tcPr/>
@@ -4263,6 +4268,432 @@
             <a:r>
               <a:rPr lang="es-CO" sz="1050" b="1" dirty="0"/>
               <a:t>3</a:t>
+            </a:r>
+          </a:p>
+        </p:txBody>
+      </p:sp>
+      <p:pic>
+        <p:nvPicPr>
+          <p:cNvPr id="2" name="Imagen 1">
+            <a:extLst>
+              <a:ext uri="{FF2B5EF4-FFF2-40B4-BE49-F238E27FC236}">
+                <a16:creationId xmlns:a16="http://schemas.microsoft.com/office/drawing/2014/main" id="{0D60061A-0C62-0DF4-110F-28DFC93457F0}"/>
+              </a:ext>
+            </a:extLst>
+          </p:cNvPr>
+          <p:cNvPicPr>
+            <a:picLocks noChangeAspect="1"/>
+          </p:cNvPicPr>
+          <p:nvPr/>
+        </p:nvPicPr>
+        <p:blipFill>
+          <a:blip r:embed="rId4"/>
+          <a:stretch>
+            <a:fillRect/>
+          </a:stretch>
+        </p:blipFill>
+        <p:spPr>
+          <a:xfrm>
+            <a:off x="4092685" y="610558"/>
+            <a:ext cx="1719536" cy="1212452"/>
+          </a:xfrm>
+          <a:prstGeom prst="rect">
+            <a:avLst/>
+          </a:prstGeom>
+        </p:spPr>
+      </p:pic>
+      <p:pic>
+        <p:nvPicPr>
+          <p:cNvPr id="3" name="Imagen 2">
+            <a:extLst>
+              <a:ext uri="{FF2B5EF4-FFF2-40B4-BE49-F238E27FC236}">
+                <a16:creationId xmlns:a16="http://schemas.microsoft.com/office/drawing/2014/main" id="{3B7BDB79-EE45-FDCB-6177-1818D94FA632}"/>
+              </a:ext>
+            </a:extLst>
+          </p:cNvPr>
+          <p:cNvPicPr>
+            <a:picLocks noChangeAspect="1"/>
+          </p:cNvPicPr>
+          <p:nvPr/>
+        </p:nvPicPr>
+        <p:blipFill>
+          <a:blip r:embed="rId5"/>
+          <a:stretch>
+            <a:fillRect/>
+          </a:stretch>
+        </p:blipFill>
+        <p:spPr>
+          <a:xfrm>
+            <a:off x="6266793" y="630166"/>
+            <a:ext cx="1563413" cy="1168946"/>
+          </a:xfrm>
+          <a:prstGeom prst="rect">
+            <a:avLst/>
+          </a:prstGeom>
+        </p:spPr>
+      </p:pic>
+      <p:sp>
+        <p:nvSpPr>
+          <p:cNvPr id="18" name="CuadroTexto 17">
+            <a:extLst>
+              <a:ext uri="{FF2B5EF4-FFF2-40B4-BE49-F238E27FC236}">
+                <a16:creationId xmlns:a16="http://schemas.microsoft.com/office/drawing/2014/main" id="{44812198-321F-9989-8B9F-242949823C7E}"/>
+              </a:ext>
+            </a:extLst>
+          </p:cNvPr>
+          <p:cNvSpPr txBox="1"/>
+          <p:nvPr/>
+        </p:nvSpPr>
+        <p:spPr>
+          <a:xfrm>
+            <a:off x="7880802" y="563704"/>
+            <a:ext cx="256802" cy="253916"/>
+          </a:xfrm>
+          <a:prstGeom prst="rect">
+            <a:avLst/>
+          </a:prstGeom>
+          <a:noFill/>
+        </p:spPr>
+        <p:txBody>
+          <a:bodyPr wrap="none" rtlCol="0">
+            <a:spAutoFit/>
+          </a:bodyPr>
+          <a:lstStyle/>
+          <a:p>
+            <a:r>
+              <a:rPr lang="es-CO" sz="1050" b="1" dirty="0"/>
+              <a:t>4</a:t>
+            </a:r>
+          </a:p>
+        </p:txBody>
+      </p:sp>
+      <p:sp>
+        <p:nvSpPr>
+          <p:cNvPr id="20" name="CuadroTexto 19">
+            <a:extLst>
+              <a:ext uri="{FF2B5EF4-FFF2-40B4-BE49-F238E27FC236}">
+                <a16:creationId xmlns:a16="http://schemas.microsoft.com/office/drawing/2014/main" id="{72B0DF6F-DC88-4B43-E229-85F612AC294D}"/>
+              </a:ext>
+            </a:extLst>
+          </p:cNvPr>
+          <p:cNvSpPr txBox="1"/>
+          <p:nvPr/>
+        </p:nvSpPr>
+        <p:spPr>
+          <a:xfrm>
+            <a:off x="1620644" y="1501698"/>
+            <a:ext cx="572430" cy="369332"/>
+          </a:xfrm>
+          <a:prstGeom prst="rect">
+            <a:avLst/>
+          </a:prstGeom>
+          <a:noFill/>
+        </p:spPr>
+        <p:txBody>
+          <a:bodyPr wrap="square" rtlCol="0">
+            <a:spAutoFit/>
+          </a:bodyPr>
+          <a:lstStyle/>
+          <a:p>
+            <a:r>
+              <a:rPr lang="es-CO" b="1" dirty="0">
+                <a:solidFill>
+                  <a:srgbClr val="FF0000"/>
+                </a:solidFill>
+              </a:rPr>
+              <a:t>FP</a:t>
+            </a:r>
+          </a:p>
+        </p:txBody>
+      </p:sp>
+      <p:sp>
+        <p:nvSpPr>
+          <p:cNvPr id="22" name="CuadroTexto 21">
+            <a:extLst>
+              <a:ext uri="{FF2B5EF4-FFF2-40B4-BE49-F238E27FC236}">
+                <a16:creationId xmlns:a16="http://schemas.microsoft.com/office/drawing/2014/main" id="{A014BA7D-DE59-7986-E5E9-A21993D923F0}"/>
+              </a:ext>
+            </a:extLst>
+          </p:cNvPr>
+          <p:cNvSpPr txBox="1"/>
+          <p:nvPr/>
+        </p:nvSpPr>
+        <p:spPr>
+          <a:xfrm>
+            <a:off x="5694556" y="1501698"/>
+            <a:ext cx="572430" cy="369332"/>
+          </a:xfrm>
+          <a:prstGeom prst="rect">
+            <a:avLst/>
+          </a:prstGeom>
+          <a:noFill/>
+        </p:spPr>
+        <p:txBody>
+          <a:bodyPr wrap="square" rtlCol="0">
+            <a:spAutoFit/>
+          </a:bodyPr>
+          <a:lstStyle/>
+          <a:p>
+            <a:r>
+              <a:rPr lang="es-CO" b="1" dirty="0">
+                <a:solidFill>
+                  <a:srgbClr val="FF0000"/>
+                </a:solidFill>
+              </a:rPr>
+              <a:t>FP</a:t>
+            </a:r>
+          </a:p>
+        </p:txBody>
+      </p:sp>
+      <p:sp>
+        <p:nvSpPr>
+          <p:cNvPr id="23" name="CuadroTexto 22">
+            <a:extLst>
+              <a:ext uri="{FF2B5EF4-FFF2-40B4-BE49-F238E27FC236}">
+                <a16:creationId xmlns:a16="http://schemas.microsoft.com/office/drawing/2014/main" id="{AE5D391D-19B4-F973-A861-8B6E41E2D07E}"/>
+              </a:ext>
+            </a:extLst>
+          </p:cNvPr>
+          <p:cNvSpPr txBox="1"/>
+          <p:nvPr/>
+        </p:nvSpPr>
+        <p:spPr>
+          <a:xfrm>
+            <a:off x="7744964" y="1482936"/>
+            <a:ext cx="572430" cy="369332"/>
+          </a:xfrm>
+          <a:prstGeom prst="rect">
+            <a:avLst/>
+          </a:prstGeom>
+          <a:noFill/>
+        </p:spPr>
+        <p:txBody>
+          <a:bodyPr wrap="square" rtlCol="0">
+            <a:spAutoFit/>
+          </a:bodyPr>
+          <a:lstStyle/>
+          <a:p>
+            <a:r>
+              <a:rPr lang="es-CO" b="1" dirty="0">
+                <a:solidFill>
+                  <a:schemeClr val="accent6"/>
+                </a:solidFill>
+              </a:rPr>
+              <a:t>TN</a:t>
+            </a:r>
+          </a:p>
+        </p:txBody>
+      </p:sp>
+      <p:sp>
+        <p:nvSpPr>
+          <p:cNvPr id="24" name="CuadroTexto 23">
+            <a:extLst>
+              <a:ext uri="{FF2B5EF4-FFF2-40B4-BE49-F238E27FC236}">
+                <a16:creationId xmlns:a16="http://schemas.microsoft.com/office/drawing/2014/main" id="{F6985B4F-E8B6-0C84-ED5B-88EAFCA33B28}"/>
+              </a:ext>
+            </a:extLst>
+          </p:cNvPr>
+          <p:cNvSpPr txBox="1"/>
+          <p:nvPr/>
+        </p:nvSpPr>
+        <p:spPr>
+          <a:xfrm>
+            <a:off x="3709639" y="1494264"/>
+            <a:ext cx="572430" cy="369332"/>
+          </a:xfrm>
+          <a:prstGeom prst="rect">
+            <a:avLst/>
+          </a:prstGeom>
+          <a:noFill/>
+        </p:spPr>
+        <p:txBody>
+          <a:bodyPr wrap="square" rtlCol="0">
+            <a:spAutoFit/>
+          </a:bodyPr>
+          <a:lstStyle/>
+          <a:p>
+            <a:endParaRPr lang="es-CO" b="1" dirty="0">
+              <a:solidFill>
+                <a:schemeClr val="tx2"/>
+              </a:solidFill>
+            </a:endParaRPr>
+          </a:p>
+        </p:txBody>
+      </p:sp>
+      <p:sp>
+        <p:nvSpPr>
+          <p:cNvPr id="25" name="CuadroTexto 24">
+            <a:extLst>
+              <a:ext uri="{FF2B5EF4-FFF2-40B4-BE49-F238E27FC236}">
+                <a16:creationId xmlns:a16="http://schemas.microsoft.com/office/drawing/2014/main" id="{755474CA-8954-7EF5-5525-891C2A079DFB}"/>
+              </a:ext>
+            </a:extLst>
+          </p:cNvPr>
+          <p:cNvSpPr txBox="1"/>
+          <p:nvPr/>
+        </p:nvSpPr>
+        <p:spPr>
+          <a:xfrm>
+            <a:off x="9905545" y="570961"/>
+            <a:ext cx="256802" cy="253916"/>
+          </a:xfrm>
+          <a:prstGeom prst="rect">
+            <a:avLst/>
+          </a:prstGeom>
+          <a:noFill/>
+        </p:spPr>
+        <p:txBody>
+          <a:bodyPr wrap="none" rtlCol="0">
+            <a:spAutoFit/>
+          </a:bodyPr>
+          <a:lstStyle/>
+          <a:p>
+            <a:r>
+              <a:rPr lang="es-CO" sz="1050" b="1" dirty="0"/>
+              <a:t>5</a:t>
+            </a:r>
+          </a:p>
+        </p:txBody>
+      </p:sp>
+      <p:sp>
+        <p:nvSpPr>
+          <p:cNvPr id="26" name="CuadroTexto 25">
+            <a:extLst>
+              <a:ext uri="{FF2B5EF4-FFF2-40B4-BE49-F238E27FC236}">
+                <a16:creationId xmlns:a16="http://schemas.microsoft.com/office/drawing/2014/main" id="{CC064938-7C29-072A-0EB0-ADC8F6473B72}"/>
+              </a:ext>
+            </a:extLst>
+          </p:cNvPr>
+          <p:cNvSpPr txBox="1"/>
+          <p:nvPr/>
+        </p:nvSpPr>
+        <p:spPr>
+          <a:xfrm>
+            <a:off x="9755192" y="1468422"/>
+            <a:ext cx="572430" cy="369332"/>
+          </a:xfrm>
+          <a:prstGeom prst="rect">
+            <a:avLst/>
+          </a:prstGeom>
+          <a:noFill/>
+        </p:spPr>
+        <p:txBody>
+          <a:bodyPr wrap="square" rtlCol="0">
+            <a:spAutoFit/>
+          </a:bodyPr>
+          <a:lstStyle/>
+          <a:p>
+            <a:r>
+              <a:rPr lang="es-CO" b="1" dirty="0"/>
+              <a:t>N</a:t>
+            </a:r>
+          </a:p>
+        </p:txBody>
+      </p:sp>
+      <p:sp>
+        <p:nvSpPr>
+          <p:cNvPr id="28" name="CuadroTexto 27">
+            <a:extLst>
+              <a:ext uri="{FF2B5EF4-FFF2-40B4-BE49-F238E27FC236}">
+                <a16:creationId xmlns:a16="http://schemas.microsoft.com/office/drawing/2014/main" id="{B792E3C1-CF62-7003-C6F9-5841164B98E6}"/>
+              </a:ext>
+            </a:extLst>
+          </p:cNvPr>
+          <p:cNvSpPr txBox="1"/>
+          <p:nvPr/>
+        </p:nvSpPr>
+        <p:spPr>
+          <a:xfrm>
+            <a:off x="9666515" y="979714"/>
+            <a:ext cx="689429" cy="415498"/>
+          </a:xfrm>
+          <a:prstGeom prst="rect">
+            <a:avLst/>
+          </a:prstGeom>
+          <a:noFill/>
+        </p:spPr>
+        <p:txBody>
+          <a:bodyPr wrap="square" rtlCol="0">
+            <a:spAutoFit/>
+          </a:bodyPr>
+          <a:lstStyle/>
+          <a:p>
+            <a:r>
+              <a:rPr lang="es-CO" sz="700" b="1" dirty="0">
+                <a:highlight>
+                  <a:srgbClr val="FFFF00"/>
+                </a:highlight>
+              </a:rPr>
+              <a:t>Clasificar como NO PICO</a:t>
+            </a:r>
+          </a:p>
+        </p:txBody>
+      </p:sp>
+      <p:pic>
+        <p:nvPicPr>
+          <p:cNvPr id="21" name="Imagen 20">
+            <a:extLst>
+              <a:ext uri="{FF2B5EF4-FFF2-40B4-BE49-F238E27FC236}">
+                <a16:creationId xmlns:a16="http://schemas.microsoft.com/office/drawing/2014/main" id="{8DE5BC3C-644D-4177-E1D7-9A992A79E6AE}"/>
+              </a:ext>
+            </a:extLst>
+          </p:cNvPr>
+          <p:cNvPicPr>
+            <a:picLocks noChangeAspect="1"/>
+          </p:cNvPicPr>
+          <p:nvPr/>
+        </p:nvPicPr>
+        <p:blipFill>
+          <a:blip r:embed="rId6"/>
+          <a:stretch>
+            <a:fillRect/>
+          </a:stretch>
+        </p:blipFill>
+        <p:spPr>
+          <a:xfrm>
+            <a:off x="8172450" y="651293"/>
+            <a:ext cx="1556393" cy="1025108"/>
+          </a:xfrm>
+          <a:prstGeom prst="rect">
+            <a:avLst/>
+          </a:prstGeom>
+        </p:spPr>
+      </p:pic>
+      <p:sp>
+        <p:nvSpPr>
+          <p:cNvPr id="29" name="CuadroTexto 28">
+            <a:extLst>
+              <a:ext uri="{FF2B5EF4-FFF2-40B4-BE49-F238E27FC236}">
+                <a16:creationId xmlns:a16="http://schemas.microsoft.com/office/drawing/2014/main" id="{6F4A80FC-38EF-8A22-7F25-B416D626C43A}"/>
+              </a:ext>
+            </a:extLst>
+          </p:cNvPr>
+          <p:cNvSpPr txBox="1"/>
+          <p:nvPr/>
+        </p:nvSpPr>
+        <p:spPr>
+          <a:xfrm>
+            <a:off x="3684328" y="1479927"/>
+            <a:ext cx="572430" cy="369332"/>
+          </a:xfrm>
+          <a:prstGeom prst="rect">
+            <a:avLst/>
+          </a:prstGeom>
+          <a:noFill/>
+        </p:spPr>
+        <p:txBody>
+          <a:bodyPr wrap="square" rtlCol="0">
+            <a:spAutoFit/>
+          </a:bodyPr>
+          <a:lstStyle/>
+          <a:p>
+            <a:r>
+              <a:rPr lang="es-CO" b="1" dirty="0">
+                <a:solidFill>
+                  <a:srgbClr val="FF0000"/>
+                </a:solidFill>
+              </a:rPr>
+              <a:t>FP</a:t>
             </a:r>
           </a:p>
         </p:txBody>

</xml_diff>